<commit_message>
added invited talks and performed adjustments
</commit_message>
<xml_diff>
--- a/resources/images.pptx
+++ b/resources/images.pptx
@@ -5,7 +5,8 @@
     <p:sldMasterId id="2147483672" r:id="rId1"/>
   </p:sldMasterIdLst>
   <p:sldIdLst>
-    <p:sldId id="256" r:id="rId2"/>
+    <p:sldId id="257" r:id="rId2"/>
+    <p:sldId id="256" r:id="rId3"/>
   </p:sldIdLst>
   <p:sldSz cx="6858000" cy="9906000" type="A4"/>
   <p:notesSz cx="6858000" cy="9144000"/>
@@ -104,6 +105,11 @@
       </a:defRPr>
     </a:lvl9pPr>
   </p:defaultTextStyle>
+  <p:extLst>
+    <p:ext uri="{EFAFB233-063F-42B5-8137-9DF3F51BA10A}">
+      <p15:sldGuideLst xmlns:p15="http://schemas.microsoft.com/office/powerpoint/2012/main"/>
+    </p:ext>
+  </p:extLst>
 </p:presentation>
 </file>
 
@@ -238,7 +244,7 @@
           <a:p>
             <a:fld id="{2651AF3B-1BD3-174A-9630-BFBC83A3749E}" type="datetimeFigureOut">
               <a:rPr lang="en-US" smtClean="0"/>
-              <a:t>5/26/20</a:t>
+              <a:t>6/4/20</a:t>
             </a:fld>
             <a:endParaRPr lang="en-US"/>
           </a:p>
@@ -408,7 +414,7 @@
           <a:p>
             <a:fld id="{2651AF3B-1BD3-174A-9630-BFBC83A3749E}" type="datetimeFigureOut">
               <a:rPr lang="en-US" smtClean="0"/>
-              <a:t>5/26/20</a:t>
+              <a:t>6/4/20</a:t>
             </a:fld>
             <a:endParaRPr lang="en-US"/>
           </a:p>
@@ -588,7 +594,7 @@
           <a:p>
             <a:fld id="{2651AF3B-1BD3-174A-9630-BFBC83A3749E}" type="datetimeFigureOut">
               <a:rPr lang="en-US" smtClean="0"/>
-              <a:t>5/26/20</a:t>
+              <a:t>6/4/20</a:t>
             </a:fld>
             <a:endParaRPr lang="en-US"/>
           </a:p>
@@ -758,7 +764,7 @@
           <a:p>
             <a:fld id="{2651AF3B-1BD3-174A-9630-BFBC83A3749E}" type="datetimeFigureOut">
               <a:rPr lang="en-US" smtClean="0"/>
-              <a:t>5/26/20</a:t>
+              <a:t>6/4/20</a:t>
             </a:fld>
             <a:endParaRPr lang="en-US"/>
           </a:p>
@@ -1002,7 +1008,7 @@
           <a:p>
             <a:fld id="{2651AF3B-1BD3-174A-9630-BFBC83A3749E}" type="datetimeFigureOut">
               <a:rPr lang="en-US" smtClean="0"/>
-              <a:t>5/26/20</a:t>
+              <a:t>6/4/20</a:t>
             </a:fld>
             <a:endParaRPr lang="en-US"/>
           </a:p>
@@ -1234,7 +1240,7 @@
           <a:p>
             <a:fld id="{2651AF3B-1BD3-174A-9630-BFBC83A3749E}" type="datetimeFigureOut">
               <a:rPr lang="en-US" smtClean="0"/>
-              <a:t>5/26/20</a:t>
+              <a:t>6/4/20</a:t>
             </a:fld>
             <a:endParaRPr lang="en-US"/>
           </a:p>
@@ -1601,7 +1607,7 @@
           <a:p>
             <a:fld id="{2651AF3B-1BD3-174A-9630-BFBC83A3749E}" type="datetimeFigureOut">
               <a:rPr lang="en-US" smtClean="0"/>
-              <a:t>5/26/20</a:t>
+              <a:t>6/4/20</a:t>
             </a:fld>
             <a:endParaRPr lang="en-US"/>
           </a:p>
@@ -1719,7 +1725,7 @@
           <a:p>
             <a:fld id="{2651AF3B-1BD3-174A-9630-BFBC83A3749E}" type="datetimeFigureOut">
               <a:rPr lang="en-US" smtClean="0"/>
-              <a:t>5/26/20</a:t>
+              <a:t>6/4/20</a:t>
             </a:fld>
             <a:endParaRPr lang="en-US"/>
           </a:p>
@@ -1814,7 +1820,7 @@
           <a:p>
             <a:fld id="{2651AF3B-1BD3-174A-9630-BFBC83A3749E}" type="datetimeFigureOut">
               <a:rPr lang="en-US" smtClean="0"/>
-              <a:t>5/26/20</a:t>
+              <a:t>6/4/20</a:t>
             </a:fld>
             <a:endParaRPr lang="en-US"/>
           </a:p>
@@ -2091,7 +2097,7 @@
           <a:p>
             <a:fld id="{2651AF3B-1BD3-174A-9630-BFBC83A3749E}" type="datetimeFigureOut">
               <a:rPr lang="en-US" smtClean="0"/>
-              <a:t>5/26/20</a:t>
+              <a:t>6/4/20</a:t>
             </a:fld>
             <a:endParaRPr lang="en-US"/>
           </a:p>
@@ -2348,7 +2354,7 @@
           <a:p>
             <a:fld id="{2651AF3B-1BD3-174A-9630-BFBC83A3749E}" type="datetimeFigureOut">
               <a:rPr lang="en-US" smtClean="0"/>
-              <a:t>5/26/20</a:t>
+              <a:t>6/4/20</a:t>
             </a:fld>
             <a:endParaRPr lang="en-US"/>
           </a:p>
@@ -2561,7 +2567,7 @@
           <a:p>
             <a:fld id="{2651AF3B-1BD3-174A-9630-BFBC83A3749E}" type="datetimeFigureOut">
               <a:rPr lang="en-US" smtClean="0"/>
-              <a:t>5/26/20</a:t>
+              <a:t>6/4/20</a:t>
             </a:fld>
             <a:endParaRPr lang="en-US"/>
           </a:p>
@@ -2968,6 +2974,868 @@
       </p:grpSpPr>
       <p:pic>
         <p:nvPicPr>
+          <p:cNvPr id="3" name="Picture 2" descr="A large building in the background&#10;&#10;Description automatically generated">
+            <a:extLst>
+              <a:ext uri="{FF2B5EF4-FFF2-40B4-BE49-F238E27FC236}">
+                <a16:creationId xmlns:a16="http://schemas.microsoft.com/office/drawing/2014/main" id="{F9800852-9174-E44D-B287-FB05CEBFEB7F}"/>
+              </a:ext>
+            </a:extLst>
+          </p:cNvPr>
+          <p:cNvPicPr>
+            <a:picLocks noChangeAspect="1"/>
+          </p:cNvPicPr>
+          <p:nvPr/>
+        </p:nvPicPr>
+        <p:blipFill>
+          <a:blip r:embed="rId2"/>
+          <a:stretch>
+            <a:fillRect/>
+          </a:stretch>
+        </p:blipFill>
+        <p:spPr>
+          <a:xfrm>
+            <a:off x="339202" y="416688"/>
+            <a:ext cx="6179595" cy="3707757"/>
+          </a:xfrm>
+          <a:prstGeom prst="rect">
+            <a:avLst/>
+          </a:prstGeom>
+        </p:spPr>
+      </p:pic>
+      <p:grpSp>
+        <p:nvGrpSpPr>
+          <p:cNvPr id="9" name="Group 8">
+            <a:extLst>
+              <a:ext uri="{FF2B5EF4-FFF2-40B4-BE49-F238E27FC236}">
+                <a16:creationId xmlns:a16="http://schemas.microsoft.com/office/drawing/2014/main" id="{C95FF78F-0E3A-FC42-A571-A8F9125BBF5C}"/>
+              </a:ext>
+            </a:extLst>
+          </p:cNvPr>
+          <p:cNvGrpSpPr/>
+          <p:nvPr/>
+        </p:nvGrpSpPr>
+        <p:grpSpPr>
+          <a:xfrm>
+            <a:off x="1811877" y="8090704"/>
+            <a:ext cx="3234244" cy="643259"/>
+            <a:chOff x="378896" y="5141388"/>
+            <a:chExt cx="4780243" cy="950743"/>
+          </a:xfrm>
+        </p:grpSpPr>
+        <p:pic>
+          <p:nvPicPr>
+            <p:cNvPr id="11" name="Picture 10" descr="A picture containing tableware, clipart, plate, dishware&#10;&#10;Description automatically generated">
+              <a:extLst>
+                <a:ext uri="{FF2B5EF4-FFF2-40B4-BE49-F238E27FC236}">
+                  <a16:creationId xmlns:a16="http://schemas.microsoft.com/office/drawing/2014/main" id="{275196A3-EA87-E04F-B82F-088F2EDE1ABA}"/>
+                </a:ext>
+              </a:extLst>
+            </p:cNvPr>
+            <p:cNvPicPr>
+              <a:picLocks noChangeAspect="1"/>
+            </p:cNvPicPr>
+            <p:nvPr/>
+          </p:nvPicPr>
+          <p:blipFill>
+            <a:blip r:embed="rId3"/>
+            <a:stretch>
+              <a:fillRect/>
+            </a:stretch>
+          </p:blipFill>
+          <p:spPr>
+            <a:xfrm>
+              <a:off x="2317375" y="5568923"/>
+              <a:ext cx="1280439" cy="517034"/>
+            </a:xfrm>
+            <a:prstGeom prst="rect">
+              <a:avLst/>
+            </a:prstGeom>
+          </p:spPr>
+        </p:pic>
+        <p:pic>
+          <p:nvPicPr>
+            <p:cNvPr id="12" name="Picture 11" descr="A picture containing food, drawing&#10;&#10;Description automatically generated">
+              <a:extLst>
+                <a:ext uri="{FF2B5EF4-FFF2-40B4-BE49-F238E27FC236}">
+                  <a16:creationId xmlns:a16="http://schemas.microsoft.com/office/drawing/2014/main" id="{A1576BFB-0F85-7645-9812-3791BCA33226}"/>
+                </a:ext>
+              </a:extLst>
+            </p:cNvPr>
+            <p:cNvPicPr>
+              <a:picLocks noChangeAspect="1"/>
+            </p:cNvPicPr>
+            <p:nvPr/>
+          </p:nvPicPr>
+          <p:blipFill>
+            <a:blip r:embed="rId4"/>
+            <a:stretch>
+              <a:fillRect/>
+            </a:stretch>
+          </p:blipFill>
+          <p:spPr>
+            <a:xfrm>
+              <a:off x="378896" y="5141388"/>
+              <a:ext cx="1864809" cy="950743"/>
+            </a:xfrm>
+            <a:prstGeom prst="rect">
+              <a:avLst/>
+            </a:prstGeom>
+          </p:spPr>
+        </p:pic>
+        <p:pic>
+          <p:nvPicPr>
+            <p:cNvPr id="13" name="Picture 12" descr="A picture containing drawing&#10;&#10;Description automatically generated">
+              <a:extLst>
+                <a:ext uri="{FF2B5EF4-FFF2-40B4-BE49-F238E27FC236}">
+                  <a16:creationId xmlns:a16="http://schemas.microsoft.com/office/drawing/2014/main" id="{C1EF9D86-7999-B240-AC65-AFFDD512E25C}"/>
+                </a:ext>
+              </a:extLst>
+            </p:cNvPr>
+            <p:cNvPicPr>
+              <a:picLocks noChangeAspect="1"/>
+            </p:cNvPicPr>
+            <p:nvPr/>
+          </p:nvPicPr>
+          <p:blipFill>
+            <a:blip r:embed="rId5"/>
+            <a:stretch>
+              <a:fillRect/>
+            </a:stretch>
+          </p:blipFill>
+          <p:spPr>
+            <a:xfrm>
+              <a:off x="3650593" y="5597690"/>
+              <a:ext cx="1508546" cy="459500"/>
+            </a:xfrm>
+            <a:prstGeom prst="rect">
+              <a:avLst/>
+            </a:prstGeom>
+          </p:spPr>
+        </p:pic>
+      </p:grpSp>
+      <p:grpSp>
+        <p:nvGrpSpPr>
+          <p:cNvPr id="5" name="Group 4">
+            <a:extLst>
+              <a:ext uri="{FF2B5EF4-FFF2-40B4-BE49-F238E27FC236}">
+                <a16:creationId xmlns:a16="http://schemas.microsoft.com/office/drawing/2014/main" id="{BA6A080C-BD0F-0543-BA3E-20AE4AB40FB4}"/>
+              </a:ext>
+            </a:extLst>
+          </p:cNvPr>
+          <p:cNvGrpSpPr/>
+          <p:nvPr/>
+        </p:nvGrpSpPr>
+        <p:grpSpPr>
+          <a:xfrm>
+            <a:off x="652289" y="8762582"/>
+            <a:ext cx="5553420" cy="823743"/>
+            <a:chOff x="747194" y="7989816"/>
+            <a:chExt cx="9632673" cy="1428821"/>
+          </a:xfrm>
+        </p:grpSpPr>
+        <p:pic>
+          <p:nvPicPr>
+            <p:cNvPr id="17" name="Graphic 16">
+              <a:extLst>
+                <a:ext uri="{FF2B5EF4-FFF2-40B4-BE49-F238E27FC236}">
+                  <a16:creationId xmlns:a16="http://schemas.microsoft.com/office/drawing/2014/main" id="{70F06B14-92CF-1943-B74E-9777CEC42363}"/>
+                </a:ext>
+              </a:extLst>
+            </p:cNvPr>
+            <p:cNvPicPr>
+              <a:picLocks noChangeAspect="1"/>
+            </p:cNvPicPr>
+            <p:nvPr/>
+          </p:nvPicPr>
+          <p:blipFill>
+            <a:blip r:embed="rId6">
+              <a:extLst>
+                <a:ext uri="{96DAC541-7B7A-43D3-8B79-37D633B846F1}">
+                  <asvg:svgBlip xmlns:asvg="http://schemas.microsoft.com/office/drawing/2016/SVG/main" r:embed="rId7"/>
+                </a:ext>
+              </a:extLst>
+            </a:blip>
+            <a:stretch>
+              <a:fillRect/>
+            </a:stretch>
+          </p:blipFill>
+          <p:spPr>
+            <a:xfrm>
+              <a:off x="747194" y="8396826"/>
+              <a:ext cx="2127045" cy="819847"/>
+            </a:xfrm>
+            <a:prstGeom prst="rect">
+              <a:avLst/>
+            </a:prstGeom>
+          </p:spPr>
+        </p:pic>
+        <p:pic>
+          <p:nvPicPr>
+            <p:cNvPr id="19" name="Picture 18" descr="A close up of a logo&#10;&#10;Description automatically generated">
+              <a:extLst>
+                <a:ext uri="{FF2B5EF4-FFF2-40B4-BE49-F238E27FC236}">
+                  <a16:creationId xmlns:a16="http://schemas.microsoft.com/office/drawing/2014/main" id="{2E3E6254-3196-4341-AA79-4DA9FC010B8F}"/>
+                </a:ext>
+              </a:extLst>
+            </p:cNvPr>
+            <p:cNvPicPr>
+              <a:picLocks noChangeAspect="1"/>
+            </p:cNvPicPr>
+            <p:nvPr/>
+          </p:nvPicPr>
+          <p:blipFill>
+            <a:blip r:embed="rId8"/>
+            <a:stretch>
+              <a:fillRect/>
+            </a:stretch>
+          </p:blipFill>
+          <p:spPr>
+            <a:xfrm>
+              <a:off x="3148973" y="8285754"/>
+              <a:ext cx="1051214" cy="1041992"/>
+            </a:xfrm>
+            <a:prstGeom prst="rect">
+              <a:avLst/>
+            </a:prstGeom>
+          </p:spPr>
+        </p:pic>
+        <p:pic>
+          <p:nvPicPr>
+            <p:cNvPr id="20" name="Picture 19" descr="A drawing of a face&#10;&#10;Description automatically generated">
+              <a:extLst>
+                <a:ext uri="{FF2B5EF4-FFF2-40B4-BE49-F238E27FC236}">
+                  <a16:creationId xmlns:a16="http://schemas.microsoft.com/office/drawing/2014/main" id="{B1C32352-324D-8A4D-AC80-EEE01CE0467B}"/>
+                </a:ext>
+              </a:extLst>
+            </p:cNvPr>
+            <p:cNvPicPr>
+              <a:picLocks noChangeAspect="1"/>
+            </p:cNvPicPr>
+            <p:nvPr/>
+          </p:nvPicPr>
+          <p:blipFill>
+            <a:blip r:embed="rId9"/>
+            <a:stretch>
+              <a:fillRect/>
+            </a:stretch>
+          </p:blipFill>
+          <p:spPr>
+            <a:xfrm>
+              <a:off x="4374901" y="8285754"/>
+              <a:ext cx="2009820" cy="1041992"/>
+            </a:xfrm>
+            <a:prstGeom prst="rect">
+              <a:avLst/>
+            </a:prstGeom>
+          </p:spPr>
+        </p:pic>
+        <p:pic>
+          <p:nvPicPr>
+            <p:cNvPr id="21" name="Picture 20" descr="A close up of a logo&#10;&#10;Description automatically generated">
+              <a:extLst>
+                <a:ext uri="{FF2B5EF4-FFF2-40B4-BE49-F238E27FC236}">
+                  <a16:creationId xmlns:a16="http://schemas.microsoft.com/office/drawing/2014/main" id="{C01360F8-EC28-C249-90EE-D98B895EEACF}"/>
+                </a:ext>
+              </a:extLst>
+            </p:cNvPr>
+            <p:cNvPicPr>
+              <a:picLocks noChangeAspect="1"/>
+            </p:cNvPicPr>
+            <p:nvPr/>
+          </p:nvPicPr>
+          <p:blipFill>
+            <a:blip r:embed="rId10"/>
+            <a:stretch>
+              <a:fillRect/>
+            </a:stretch>
+          </p:blipFill>
+          <p:spPr>
+            <a:xfrm>
+              <a:off x="6559435" y="8284985"/>
+              <a:ext cx="2411383" cy="1042760"/>
+            </a:xfrm>
+            <a:prstGeom prst="rect">
+              <a:avLst/>
+            </a:prstGeom>
+          </p:spPr>
+        </p:pic>
+        <p:pic>
+          <p:nvPicPr>
+            <p:cNvPr id="22" name="Picture 21" descr="A screenshot of a cell phone&#10;&#10;Description automatically generated">
+              <a:extLst>
+                <a:ext uri="{FF2B5EF4-FFF2-40B4-BE49-F238E27FC236}">
+                  <a16:creationId xmlns:a16="http://schemas.microsoft.com/office/drawing/2014/main" id="{E2CD0736-59E9-AF41-B2A7-8C8867C69505}"/>
+                </a:ext>
+              </a:extLst>
+            </p:cNvPr>
+            <p:cNvPicPr>
+              <a:picLocks noChangeAspect="1"/>
+            </p:cNvPicPr>
+            <p:nvPr/>
+          </p:nvPicPr>
+          <p:blipFill>
+            <a:blip r:embed="rId11"/>
+            <a:stretch>
+              <a:fillRect/>
+            </a:stretch>
+          </p:blipFill>
+          <p:spPr>
+            <a:xfrm>
+              <a:off x="9311412" y="7989816"/>
+              <a:ext cx="1068455" cy="1428821"/>
+            </a:xfrm>
+            <a:prstGeom prst="rect">
+              <a:avLst/>
+            </a:prstGeom>
+          </p:spPr>
+        </p:pic>
+      </p:grpSp>
+      <p:pic>
+        <p:nvPicPr>
+          <p:cNvPr id="18" name="Picture 17" descr="9bebe25a1362c56393d44c9c35d54fad.jpg">
+            <a:extLst>
+              <a:ext uri="{FF2B5EF4-FFF2-40B4-BE49-F238E27FC236}">
+                <a16:creationId xmlns:a16="http://schemas.microsoft.com/office/drawing/2014/main" id="{D2BBBD07-1771-204C-B28C-4A195CA258F4}"/>
+              </a:ext>
+            </a:extLst>
+          </p:cNvPr>
+          <p:cNvPicPr>
+            <a:picLocks noChangeAspect="1"/>
+          </p:cNvPicPr>
+          <p:nvPr/>
+        </p:nvPicPr>
+        <p:blipFill>
+          <a:blip r:embed="rId12">
+            <a:extLst>
+              <a:ext uri="{28A0092B-C50C-407E-A947-70E740481C1C}">
+                <a14:useLocalDpi xmlns:a14="http://schemas.microsoft.com/office/drawing/2010/main" val="0"/>
+              </a:ext>
+            </a:extLst>
+          </a:blip>
+          <a:stretch>
+            <a:fillRect/>
+          </a:stretch>
+        </p:blipFill>
+        <p:spPr>
+          <a:xfrm>
+            <a:off x="314119" y="4227130"/>
+            <a:ext cx="2134835" cy="1445461"/>
+          </a:xfrm>
+          <a:prstGeom prst="rect">
+            <a:avLst/>
+          </a:prstGeom>
+        </p:spPr>
+      </p:pic>
+      <p:sp>
+        <p:nvSpPr>
+          <p:cNvPr id="23" name="Title 1">
+            <a:extLst>
+              <a:ext uri="{FF2B5EF4-FFF2-40B4-BE49-F238E27FC236}">
+                <a16:creationId xmlns:a16="http://schemas.microsoft.com/office/drawing/2014/main" id="{56A6F471-6057-E74E-BBF6-FFCD3D0D6FC5}"/>
+              </a:ext>
+            </a:extLst>
+          </p:cNvPr>
+          <p:cNvSpPr txBox="1">
+            <a:spLocks/>
+          </p:cNvSpPr>
+          <p:nvPr/>
+        </p:nvSpPr>
+        <p:spPr>
+          <a:xfrm>
+            <a:off x="2743731" y="4470004"/>
+            <a:ext cx="3775066" cy="611282"/>
+          </a:xfrm>
+          <a:prstGeom prst="rect">
+            <a:avLst/>
+          </a:prstGeom>
+        </p:spPr>
+        <p:txBody>
+          <a:bodyPr/>
+          <a:lstStyle>
+            <a:lvl1pPr algn="l" defTabSz="685800" rtl="0" eaLnBrk="1" latinLnBrk="0" hangingPunct="1">
+              <a:lnSpc>
+                <a:spcPct val="90000"/>
+              </a:lnSpc>
+              <a:spcBef>
+                <a:spcPct val="0"/>
+              </a:spcBef>
+              <a:buNone/>
+              <a:defRPr sz="3300" kern="1200">
+                <a:solidFill>
+                  <a:schemeClr val="tx1"/>
+                </a:solidFill>
+                <a:latin typeface="+mj-lt"/>
+                <a:ea typeface="+mj-ea"/>
+                <a:cs typeface="+mj-cs"/>
+              </a:defRPr>
+            </a:lvl1pPr>
+          </a:lstStyle>
+          <a:p>
+            <a:pPr algn="ctr"/>
+            <a:r>
+              <a:rPr lang="en-US" dirty="0"/>
+              <a:t>IPMU2020 </a:t>
+            </a:r>
+            <a:r>
+              <a:rPr lang="en-US" dirty="0" err="1"/>
+              <a:t>Lisboa</a:t>
+            </a:r>
+            <a:endParaRPr lang="en-US" dirty="0"/>
+          </a:p>
+        </p:txBody>
+      </p:sp>
+      <p:sp>
+        <p:nvSpPr>
+          <p:cNvPr id="24" name="Subtitle 2">
+            <a:extLst>
+              <a:ext uri="{FF2B5EF4-FFF2-40B4-BE49-F238E27FC236}">
+                <a16:creationId xmlns:a16="http://schemas.microsoft.com/office/drawing/2014/main" id="{365D3563-8E64-1E4D-A3F7-7D64ACCB805C}"/>
+              </a:ext>
+            </a:extLst>
+          </p:cNvPr>
+          <p:cNvSpPr txBox="1">
+            <a:spLocks/>
+          </p:cNvSpPr>
+          <p:nvPr/>
+        </p:nvSpPr>
+        <p:spPr>
+          <a:xfrm>
+            <a:off x="339202" y="5661838"/>
+            <a:ext cx="6179595" cy="924726"/>
+          </a:xfrm>
+          <a:prstGeom prst="rect">
+            <a:avLst/>
+          </a:prstGeom>
+        </p:spPr>
+        <p:txBody>
+          <a:bodyPr vert="horz" lIns="91440" tIns="45720" rIns="91440" bIns="45720" rtlCol="0">
+            <a:noAutofit/>
+          </a:bodyPr>
+          <a:lstStyle>
+            <a:lvl1pPr marL="0" indent="0" algn="ctr" defTabSz="457200" rtl="0" eaLnBrk="1" latinLnBrk="0" hangingPunct="1">
+              <a:spcBef>
+                <a:spcPct val="20000"/>
+              </a:spcBef>
+              <a:buFont typeface="Arial"/>
+              <a:buNone/>
+              <a:defRPr sz="3200" kern="1200">
+                <a:solidFill>
+                  <a:schemeClr val="tx1">
+                    <a:tint val="75000"/>
+                  </a:schemeClr>
+                </a:solidFill>
+                <a:latin typeface="+mn-lt"/>
+                <a:ea typeface="+mn-ea"/>
+                <a:cs typeface="+mn-cs"/>
+              </a:defRPr>
+            </a:lvl1pPr>
+            <a:lvl2pPr marL="457200" indent="0" algn="ctr" defTabSz="457200" rtl="0" eaLnBrk="1" latinLnBrk="0" hangingPunct="1">
+              <a:spcBef>
+                <a:spcPct val="20000"/>
+              </a:spcBef>
+              <a:buFont typeface="Arial"/>
+              <a:buNone/>
+              <a:defRPr sz="2800" kern="1200">
+                <a:solidFill>
+                  <a:schemeClr val="tx1">
+                    <a:tint val="75000"/>
+                  </a:schemeClr>
+                </a:solidFill>
+                <a:latin typeface="+mn-lt"/>
+                <a:ea typeface="+mn-ea"/>
+                <a:cs typeface="+mn-cs"/>
+              </a:defRPr>
+            </a:lvl2pPr>
+            <a:lvl3pPr marL="914400" indent="0" algn="ctr" defTabSz="457200" rtl="0" eaLnBrk="1" latinLnBrk="0" hangingPunct="1">
+              <a:spcBef>
+                <a:spcPct val="20000"/>
+              </a:spcBef>
+              <a:buFont typeface="Arial"/>
+              <a:buNone/>
+              <a:defRPr sz="2400" kern="1200">
+                <a:solidFill>
+                  <a:schemeClr val="tx1">
+                    <a:tint val="75000"/>
+                  </a:schemeClr>
+                </a:solidFill>
+                <a:latin typeface="+mn-lt"/>
+                <a:ea typeface="+mn-ea"/>
+                <a:cs typeface="+mn-cs"/>
+              </a:defRPr>
+            </a:lvl3pPr>
+            <a:lvl4pPr marL="1371600" indent="0" algn="ctr" defTabSz="457200" rtl="0" eaLnBrk="1" latinLnBrk="0" hangingPunct="1">
+              <a:spcBef>
+                <a:spcPct val="20000"/>
+              </a:spcBef>
+              <a:buFont typeface="Arial"/>
+              <a:buNone/>
+              <a:defRPr sz="2000" kern="1200">
+                <a:solidFill>
+                  <a:schemeClr val="tx1">
+                    <a:tint val="75000"/>
+                  </a:schemeClr>
+                </a:solidFill>
+                <a:latin typeface="+mn-lt"/>
+                <a:ea typeface="+mn-ea"/>
+                <a:cs typeface="+mn-cs"/>
+              </a:defRPr>
+            </a:lvl4pPr>
+            <a:lvl5pPr marL="1828800" indent="0" algn="ctr" defTabSz="457200" rtl="0" eaLnBrk="1" latinLnBrk="0" hangingPunct="1">
+              <a:spcBef>
+                <a:spcPct val="20000"/>
+              </a:spcBef>
+              <a:buFont typeface="Arial"/>
+              <a:buNone/>
+              <a:defRPr sz="2000" kern="1200">
+                <a:solidFill>
+                  <a:schemeClr val="tx1">
+                    <a:tint val="75000"/>
+                  </a:schemeClr>
+                </a:solidFill>
+                <a:latin typeface="+mn-lt"/>
+                <a:ea typeface="+mn-ea"/>
+                <a:cs typeface="+mn-cs"/>
+              </a:defRPr>
+            </a:lvl5pPr>
+            <a:lvl6pPr marL="2286000" indent="0" algn="ctr" defTabSz="457200" rtl="0" eaLnBrk="1" latinLnBrk="0" hangingPunct="1">
+              <a:spcBef>
+                <a:spcPct val="20000"/>
+              </a:spcBef>
+              <a:buFont typeface="Arial"/>
+              <a:buNone/>
+              <a:defRPr sz="2000" kern="1200">
+                <a:solidFill>
+                  <a:schemeClr val="tx1">
+                    <a:tint val="75000"/>
+                  </a:schemeClr>
+                </a:solidFill>
+                <a:latin typeface="+mn-lt"/>
+                <a:ea typeface="+mn-ea"/>
+                <a:cs typeface="+mn-cs"/>
+              </a:defRPr>
+            </a:lvl6pPr>
+            <a:lvl7pPr marL="2743200" indent="0" algn="ctr" defTabSz="457200" rtl="0" eaLnBrk="1" latinLnBrk="0" hangingPunct="1">
+              <a:spcBef>
+                <a:spcPct val="20000"/>
+              </a:spcBef>
+              <a:buFont typeface="Arial"/>
+              <a:buNone/>
+              <a:defRPr sz="2000" kern="1200">
+                <a:solidFill>
+                  <a:schemeClr val="tx1">
+                    <a:tint val="75000"/>
+                  </a:schemeClr>
+                </a:solidFill>
+                <a:latin typeface="+mn-lt"/>
+                <a:ea typeface="+mn-ea"/>
+                <a:cs typeface="+mn-cs"/>
+              </a:defRPr>
+            </a:lvl7pPr>
+            <a:lvl8pPr marL="3200400" indent="0" algn="ctr" defTabSz="457200" rtl="0" eaLnBrk="1" latinLnBrk="0" hangingPunct="1">
+              <a:spcBef>
+                <a:spcPct val="20000"/>
+              </a:spcBef>
+              <a:buFont typeface="Arial"/>
+              <a:buNone/>
+              <a:defRPr sz="2000" kern="1200">
+                <a:solidFill>
+                  <a:schemeClr val="tx1">
+                    <a:tint val="75000"/>
+                  </a:schemeClr>
+                </a:solidFill>
+                <a:latin typeface="+mn-lt"/>
+                <a:ea typeface="+mn-ea"/>
+                <a:cs typeface="+mn-cs"/>
+              </a:defRPr>
+            </a:lvl8pPr>
+            <a:lvl9pPr marL="3657600" indent="0" algn="ctr" defTabSz="457200" rtl="0" eaLnBrk="1" latinLnBrk="0" hangingPunct="1">
+              <a:spcBef>
+                <a:spcPct val="20000"/>
+              </a:spcBef>
+              <a:buFont typeface="Arial"/>
+              <a:buNone/>
+              <a:defRPr sz="2000" kern="1200">
+                <a:solidFill>
+                  <a:schemeClr val="tx1">
+                    <a:tint val="75000"/>
+                  </a:schemeClr>
+                </a:solidFill>
+                <a:latin typeface="+mn-lt"/>
+                <a:ea typeface="+mn-ea"/>
+                <a:cs typeface="+mn-cs"/>
+              </a:defRPr>
+            </a:lvl9pPr>
+          </a:lstStyle>
+          <a:p>
+            <a:r>
+              <a:rPr lang="en-US" sz="1600" dirty="0">
+                <a:solidFill>
+                  <a:srgbClr val="000000"/>
+                </a:solidFill>
+              </a:rPr>
+              <a:t>18</a:t>
+            </a:r>
+            <a:r>
+              <a:rPr lang="en-US" sz="1600" baseline="30000" dirty="0">
+                <a:solidFill>
+                  <a:srgbClr val="000000"/>
+                </a:solidFill>
+              </a:rPr>
+              <a:t>th</a:t>
+            </a:r>
+            <a:r>
+              <a:rPr lang="en-US" sz="1600" dirty="0">
+                <a:solidFill>
+                  <a:srgbClr val="000000"/>
+                </a:solidFill>
+              </a:rPr>
+              <a:t> International Conference on Information Processing and Management of Uncertainty in Knowledge-Based Systems</a:t>
+            </a:r>
+          </a:p>
+        </p:txBody>
+      </p:sp>
+      <p:sp>
+        <p:nvSpPr>
+          <p:cNvPr id="25" name="Subtitle 2">
+            <a:extLst>
+              <a:ext uri="{FF2B5EF4-FFF2-40B4-BE49-F238E27FC236}">
+                <a16:creationId xmlns:a16="http://schemas.microsoft.com/office/drawing/2014/main" id="{053322D3-F5E0-0242-B745-B5352487FEB6}"/>
+              </a:ext>
+            </a:extLst>
+          </p:cNvPr>
+          <p:cNvSpPr txBox="1">
+            <a:spLocks/>
+          </p:cNvSpPr>
+          <p:nvPr/>
+        </p:nvSpPr>
+        <p:spPr>
+          <a:xfrm>
+            <a:off x="2643005" y="5038418"/>
+            <a:ext cx="3875792" cy="466183"/>
+          </a:xfrm>
+          <a:prstGeom prst="rect">
+            <a:avLst/>
+          </a:prstGeom>
+        </p:spPr>
+        <p:txBody>
+          <a:bodyPr>
+            <a:normAutofit/>
+          </a:bodyPr>
+          <a:lstStyle>
+            <a:lvl1pPr marL="171450" indent="-171450" algn="l" defTabSz="685800" rtl="0" eaLnBrk="1" latinLnBrk="0" hangingPunct="1">
+              <a:lnSpc>
+                <a:spcPct val="90000"/>
+              </a:lnSpc>
+              <a:spcBef>
+                <a:spcPts val="750"/>
+              </a:spcBef>
+              <a:buFont typeface="Arial" panose="020B0604020202020204" pitchFamily="34" charset="0"/>
+              <a:buChar char="•"/>
+              <a:defRPr sz="2100" kern="1200">
+                <a:solidFill>
+                  <a:schemeClr val="tx1"/>
+                </a:solidFill>
+                <a:latin typeface="+mn-lt"/>
+                <a:ea typeface="+mn-ea"/>
+                <a:cs typeface="+mn-cs"/>
+              </a:defRPr>
+            </a:lvl1pPr>
+            <a:lvl2pPr marL="514350" indent="-171450" algn="l" defTabSz="685800" rtl="0" eaLnBrk="1" latinLnBrk="0" hangingPunct="1">
+              <a:lnSpc>
+                <a:spcPct val="90000"/>
+              </a:lnSpc>
+              <a:spcBef>
+                <a:spcPts val="375"/>
+              </a:spcBef>
+              <a:buFont typeface="Arial" panose="020B0604020202020204" pitchFamily="34" charset="0"/>
+              <a:buChar char="•"/>
+              <a:defRPr sz="1800" kern="1200">
+                <a:solidFill>
+                  <a:schemeClr val="tx1"/>
+                </a:solidFill>
+                <a:latin typeface="+mn-lt"/>
+                <a:ea typeface="+mn-ea"/>
+                <a:cs typeface="+mn-cs"/>
+              </a:defRPr>
+            </a:lvl2pPr>
+            <a:lvl3pPr marL="857250" indent="-171450" algn="l" defTabSz="685800" rtl="0" eaLnBrk="1" latinLnBrk="0" hangingPunct="1">
+              <a:lnSpc>
+                <a:spcPct val="90000"/>
+              </a:lnSpc>
+              <a:spcBef>
+                <a:spcPts val="375"/>
+              </a:spcBef>
+              <a:buFont typeface="Arial" panose="020B0604020202020204" pitchFamily="34" charset="0"/>
+              <a:buChar char="•"/>
+              <a:defRPr sz="1500" kern="1200">
+                <a:solidFill>
+                  <a:schemeClr val="tx1"/>
+                </a:solidFill>
+                <a:latin typeface="+mn-lt"/>
+                <a:ea typeface="+mn-ea"/>
+                <a:cs typeface="+mn-cs"/>
+              </a:defRPr>
+            </a:lvl3pPr>
+            <a:lvl4pPr marL="1200150" indent="-171450" algn="l" defTabSz="685800" rtl="0" eaLnBrk="1" latinLnBrk="0" hangingPunct="1">
+              <a:lnSpc>
+                <a:spcPct val="90000"/>
+              </a:lnSpc>
+              <a:spcBef>
+                <a:spcPts val="375"/>
+              </a:spcBef>
+              <a:buFont typeface="Arial" panose="020B0604020202020204" pitchFamily="34" charset="0"/>
+              <a:buChar char="•"/>
+              <a:defRPr sz="1350" kern="1200">
+                <a:solidFill>
+                  <a:schemeClr val="tx1"/>
+                </a:solidFill>
+                <a:latin typeface="+mn-lt"/>
+                <a:ea typeface="+mn-ea"/>
+                <a:cs typeface="+mn-cs"/>
+              </a:defRPr>
+            </a:lvl4pPr>
+            <a:lvl5pPr marL="1543050" indent="-171450" algn="l" defTabSz="685800" rtl="0" eaLnBrk="1" latinLnBrk="0" hangingPunct="1">
+              <a:lnSpc>
+                <a:spcPct val="90000"/>
+              </a:lnSpc>
+              <a:spcBef>
+                <a:spcPts val="375"/>
+              </a:spcBef>
+              <a:buFont typeface="Arial" panose="020B0604020202020204" pitchFamily="34" charset="0"/>
+              <a:buChar char="•"/>
+              <a:defRPr sz="1350" kern="1200">
+                <a:solidFill>
+                  <a:schemeClr val="tx1"/>
+                </a:solidFill>
+                <a:latin typeface="+mn-lt"/>
+                <a:ea typeface="+mn-ea"/>
+                <a:cs typeface="+mn-cs"/>
+              </a:defRPr>
+            </a:lvl5pPr>
+            <a:lvl6pPr marL="1885950" indent="-171450" algn="l" defTabSz="685800" rtl="0" eaLnBrk="1" latinLnBrk="0" hangingPunct="1">
+              <a:lnSpc>
+                <a:spcPct val="90000"/>
+              </a:lnSpc>
+              <a:spcBef>
+                <a:spcPts val="375"/>
+              </a:spcBef>
+              <a:buFont typeface="Arial" panose="020B0604020202020204" pitchFamily="34" charset="0"/>
+              <a:buChar char="•"/>
+              <a:defRPr sz="1350" kern="1200">
+                <a:solidFill>
+                  <a:schemeClr val="tx1"/>
+                </a:solidFill>
+                <a:latin typeface="+mn-lt"/>
+                <a:ea typeface="+mn-ea"/>
+                <a:cs typeface="+mn-cs"/>
+              </a:defRPr>
+            </a:lvl6pPr>
+            <a:lvl7pPr marL="2228850" indent="-171450" algn="l" defTabSz="685800" rtl="0" eaLnBrk="1" latinLnBrk="0" hangingPunct="1">
+              <a:lnSpc>
+                <a:spcPct val="90000"/>
+              </a:lnSpc>
+              <a:spcBef>
+                <a:spcPts val="375"/>
+              </a:spcBef>
+              <a:buFont typeface="Arial" panose="020B0604020202020204" pitchFamily="34" charset="0"/>
+              <a:buChar char="•"/>
+              <a:defRPr sz="1350" kern="1200">
+                <a:solidFill>
+                  <a:schemeClr val="tx1"/>
+                </a:solidFill>
+                <a:latin typeface="+mn-lt"/>
+                <a:ea typeface="+mn-ea"/>
+                <a:cs typeface="+mn-cs"/>
+              </a:defRPr>
+            </a:lvl7pPr>
+            <a:lvl8pPr marL="2571750" indent="-171450" algn="l" defTabSz="685800" rtl="0" eaLnBrk="1" latinLnBrk="0" hangingPunct="1">
+              <a:lnSpc>
+                <a:spcPct val="90000"/>
+              </a:lnSpc>
+              <a:spcBef>
+                <a:spcPts val="375"/>
+              </a:spcBef>
+              <a:buFont typeface="Arial" panose="020B0604020202020204" pitchFamily="34" charset="0"/>
+              <a:buChar char="•"/>
+              <a:defRPr sz="1350" kern="1200">
+                <a:solidFill>
+                  <a:schemeClr val="tx1"/>
+                </a:solidFill>
+                <a:latin typeface="+mn-lt"/>
+                <a:ea typeface="+mn-ea"/>
+                <a:cs typeface="+mn-cs"/>
+              </a:defRPr>
+            </a:lvl8pPr>
+            <a:lvl9pPr marL="2914650" indent="-171450" algn="l" defTabSz="685800" rtl="0" eaLnBrk="1" latinLnBrk="0" hangingPunct="1">
+              <a:lnSpc>
+                <a:spcPct val="90000"/>
+              </a:lnSpc>
+              <a:spcBef>
+                <a:spcPts val="375"/>
+              </a:spcBef>
+              <a:buFont typeface="Arial" panose="020B0604020202020204" pitchFamily="34" charset="0"/>
+              <a:buChar char="•"/>
+              <a:defRPr sz="1350" kern="1200">
+                <a:solidFill>
+                  <a:schemeClr val="tx1"/>
+                </a:solidFill>
+                <a:latin typeface="+mn-lt"/>
+                <a:ea typeface="+mn-ea"/>
+                <a:cs typeface="+mn-cs"/>
+              </a:defRPr>
+            </a:lvl9pPr>
+          </a:lstStyle>
+          <a:p>
+            <a:pPr marL="0" indent="0" algn="ctr">
+              <a:buNone/>
+            </a:pPr>
+            <a:r>
+              <a:rPr lang="en-US" sz="2000" dirty="0"/>
+              <a:t>15-19</a:t>
+            </a:r>
+            <a:r>
+              <a:rPr lang="en-US" sz="2000" baseline="30000" dirty="0"/>
+              <a:t>th</a:t>
+            </a:r>
+            <a:r>
+              <a:rPr lang="en-US" sz="2000" dirty="0"/>
+              <a:t> June 2020, Lisbon, Portugal</a:t>
+            </a:r>
+          </a:p>
+        </p:txBody>
+      </p:sp>
+    </p:spTree>
+    <p:extLst>
+      <p:ext uri="{BB962C8B-B14F-4D97-AF65-F5344CB8AC3E}">
+        <p14:creationId xmlns:p14="http://schemas.microsoft.com/office/powerpoint/2010/main" val="1429301756"/>
+      </p:ext>
+    </p:extLst>
+  </p:cSld>
+  <p:clrMapOvr>
+    <a:masterClrMapping/>
+  </p:clrMapOvr>
+</p:sld>
+</file>
+
+<file path=ppt/slides/slide2.xml><?xml version="1.0" encoding="utf-8"?>
+<p:sld xmlns:a="http://schemas.openxmlformats.org/drawingml/2006/main" xmlns:r="http://schemas.openxmlformats.org/officeDocument/2006/relationships" xmlns:p="http://schemas.openxmlformats.org/presentationml/2006/main">
+  <p:cSld>
+    <p:spTree>
+      <p:nvGrpSpPr>
+        <p:cNvPr id="1" name=""/>
+        <p:cNvGrpSpPr/>
+        <p:nvPr/>
+      </p:nvGrpSpPr>
+      <p:grpSpPr>
+        <a:xfrm>
+          <a:off x="0" y="0"/>
+          <a:ext cx="0" cy="0"/>
+          <a:chOff x="0" y="0"/>
+          <a:chExt cx="0" cy="0"/>
+        </a:xfrm>
+      </p:grpSpPr>
+      <p:pic>
+        <p:nvPicPr>
           <p:cNvPr id="4" name="Picture 3">
             <a:extLst>
               <a:ext uri="{FF2B5EF4-FFF2-40B4-BE49-F238E27FC236}">

</xml_diff>

<commit_message>
small corrections: index, front cover, citations
</commit_message>
<xml_diff>
--- a/resources/images.pptx
+++ b/resources/images.pptx
@@ -244,7 +244,7 @@
           <a:p>
             <a:fld id="{2651AF3B-1BD3-174A-9630-BFBC83A3749E}" type="datetimeFigureOut">
               <a:rPr lang="en-US" smtClean="0"/>
-              <a:t>6/4/20</a:t>
+              <a:t>6/5/20</a:t>
             </a:fld>
             <a:endParaRPr lang="en-US"/>
           </a:p>
@@ -414,7 +414,7 @@
           <a:p>
             <a:fld id="{2651AF3B-1BD3-174A-9630-BFBC83A3749E}" type="datetimeFigureOut">
               <a:rPr lang="en-US" smtClean="0"/>
-              <a:t>6/4/20</a:t>
+              <a:t>6/5/20</a:t>
             </a:fld>
             <a:endParaRPr lang="en-US"/>
           </a:p>
@@ -594,7 +594,7 @@
           <a:p>
             <a:fld id="{2651AF3B-1BD3-174A-9630-BFBC83A3749E}" type="datetimeFigureOut">
               <a:rPr lang="en-US" smtClean="0"/>
-              <a:t>6/4/20</a:t>
+              <a:t>6/5/20</a:t>
             </a:fld>
             <a:endParaRPr lang="en-US"/>
           </a:p>
@@ -764,7 +764,7 @@
           <a:p>
             <a:fld id="{2651AF3B-1BD3-174A-9630-BFBC83A3749E}" type="datetimeFigureOut">
               <a:rPr lang="en-US" smtClean="0"/>
-              <a:t>6/4/20</a:t>
+              <a:t>6/5/20</a:t>
             </a:fld>
             <a:endParaRPr lang="en-US"/>
           </a:p>
@@ -1008,7 +1008,7 @@
           <a:p>
             <a:fld id="{2651AF3B-1BD3-174A-9630-BFBC83A3749E}" type="datetimeFigureOut">
               <a:rPr lang="en-US" smtClean="0"/>
-              <a:t>6/4/20</a:t>
+              <a:t>6/5/20</a:t>
             </a:fld>
             <a:endParaRPr lang="en-US"/>
           </a:p>
@@ -1240,7 +1240,7 @@
           <a:p>
             <a:fld id="{2651AF3B-1BD3-174A-9630-BFBC83A3749E}" type="datetimeFigureOut">
               <a:rPr lang="en-US" smtClean="0"/>
-              <a:t>6/4/20</a:t>
+              <a:t>6/5/20</a:t>
             </a:fld>
             <a:endParaRPr lang="en-US"/>
           </a:p>
@@ -1607,7 +1607,7 @@
           <a:p>
             <a:fld id="{2651AF3B-1BD3-174A-9630-BFBC83A3749E}" type="datetimeFigureOut">
               <a:rPr lang="en-US" smtClean="0"/>
-              <a:t>6/4/20</a:t>
+              <a:t>6/5/20</a:t>
             </a:fld>
             <a:endParaRPr lang="en-US"/>
           </a:p>
@@ -1725,7 +1725,7 @@
           <a:p>
             <a:fld id="{2651AF3B-1BD3-174A-9630-BFBC83A3749E}" type="datetimeFigureOut">
               <a:rPr lang="en-US" smtClean="0"/>
-              <a:t>6/4/20</a:t>
+              <a:t>6/5/20</a:t>
             </a:fld>
             <a:endParaRPr lang="en-US"/>
           </a:p>
@@ -1820,7 +1820,7 @@
           <a:p>
             <a:fld id="{2651AF3B-1BD3-174A-9630-BFBC83A3749E}" type="datetimeFigureOut">
               <a:rPr lang="en-US" smtClean="0"/>
-              <a:t>6/4/20</a:t>
+              <a:t>6/5/20</a:t>
             </a:fld>
             <a:endParaRPr lang="en-US"/>
           </a:p>
@@ -2097,7 +2097,7 @@
           <a:p>
             <a:fld id="{2651AF3B-1BD3-174A-9630-BFBC83A3749E}" type="datetimeFigureOut">
               <a:rPr lang="en-US" smtClean="0"/>
-              <a:t>6/4/20</a:t>
+              <a:t>6/5/20</a:t>
             </a:fld>
             <a:endParaRPr lang="en-US"/>
           </a:p>
@@ -2354,7 +2354,7 @@
           <a:p>
             <a:fld id="{2651AF3B-1BD3-174A-9630-BFBC83A3749E}" type="datetimeFigureOut">
               <a:rPr lang="en-US" smtClean="0"/>
-              <a:t>6/4/20</a:t>
+              <a:t>6/5/20</a:t>
             </a:fld>
             <a:endParaRPr lang="en-US"/>
           </a:p>
@@ -2567,7 +2567,7 @@
           <a:p>
             <a:fld id="{2651AF3B-1BD3-174A-9630-BFBC83A3749E}" type="datetimeFigureOut">
               <a:rPr lang="en-US" smtClean="0"/>
-              <a:t>6/4/20</a:t>
+              <a:t>6/5/20</a:t>
             </a:fld>
             <a:endParaRPr lang="en-US"/>
           </a:p>
@@ -2994,7 +2994,7 @@
         </p:blipFill>
         <p:spPr>
           <a:xfrm>
-            <a:off x="339202" y="416688"/>
+            <a:off x="339202" y="2953416"/>
             <a:ext cx="6179595" cy="3707757"/>
           </a:xfrm>
           <a:prstGeom prst="rect">
@@ -3016,10 +3016,10 @@
         </p:nvGrpSpPr>
         <p:grpSpPr>
           <a:xfrm>
-            <a:off x="1811877" y="8090704"/>
-            <a:ext cx="3234244" cy="643259"/>
+            <a:off x="1644730" y="7392610"/>
+            <a:ext cx="3460384" cy="643259"/>
             <a:chOff x="378896" y="5141388"/>
-            <a:chExt cx="4780243" cy="950743"/>
+            <a:chExt cx="5114483" cy="950743"/>
           </a:xfrm>
         </p:grpSpPr>
         <p:pic>
@@ -3044,8 +3044,8 @@
           </p:blipFill>
           <p:spPr>
             <a:xfrm>
-              <a:off x="2317375" y="5568923"/>
-              <a:ext cx="1280439" cy="517034"/>
+              <a:off x="2651613" y="5568923"/>
+              <a:ext cx="1280440" cy="517034"/>
             </a:xfrm>
             <a:prstGeom prst="rect">
               <a:avLst/>
@@ -3104,8 +3104,8 @@
           </p:blipFill>
           <p:spPr>
             <a:xfrm>
-              <a:off x="3650593" y="5597690"/>
-              <a:ext cx="1508546" cy="459500"/>
+              <a:off x="3984831" y="5597689"/>
+              <a:ext cx="1508548" cy="459500"/>
             </a:xfrm>
             <a:prstGeom prst="rect">
               <a:avLst/>
@@ -3127,7 +3127,7 @@
         </p:nvGrpSpPr>
         <p:grpSpPr>
           <a:xfrm>
-            <a:off x="652289" y="8762582"/>
+            <a:off x="652289" y="8300464"/>
             <a:ext cx="5553420" cy="823743"/>
             <a:chOff x="747194" y="7989816"/>
             <a:chExt cx="9632673" cy="1428821"/>
@@ -3318,7 +3318,7 @@
         </p:blipFill>
         <p:spPr>
           <a:xfrm>
-            <a:off x="314119" y="4227130"/>
+            <a:off x="481263" y="775998"/>
             <a:ext cx="2134835" cy="1445461"/>
           </a:xfrm>
           <a:prstGeom prst="rect">
@@ -3342,7 +3342,7 @@
         </p:nvSpPr>
         <p:spPr>
           <a:xfrm>
-            <a:off x="2743731" y="4470004"/>
+            <a:off x="2596248" y="1018872"/>
             <a:ext cx="3775066" cy="611282"/>
           </a:xfrm>
           <a:prstGeom prst="rect">
@@ -3400,7 +3400,7 @@
         </p:nvSpPr>
         <p:spPr>
           <a:xfrm>
-            <a:off x="339202" y="5661838"/>
+            <a:off x="339202" y="2043557"/>
             <a:ext cx="6179595" cy="924726"/>
           </a:xfrm>
           <a:prstGeom prst="rect">
@@ -3610,7 +3610,7 @@
         </p:nvSpPr>
         <p:spPr>
           <a:xfrm>
-            <a:off x="2643005" y="5038418"/>
+            <a:off x="2495522" y="1587286"/>
             <a:ext cx="3875792" cy="466183"/>
           </a:xfrm>
           <a:prstGeom prst="rect">

</xml_diff>

<commit_message>
small change in the schedule
</commit_message>
<xml_diff>
--- a/resources/images.pptx
+++ b/resources/images.pptx
@@ -244,7 +244,7 @@
           <a:p>
             <a:fld id="{2651AF3B-1BD3-174A-9630-BFBC83A3749E}" type="datetimeFigureOut">
               <a:rPr lang="en-US" smtClean="0"/>
-              <a:t>6/5/20</a:t>
+              <a:t>6/11/20</a:t>
             </a:fld>
             <a:endParaRPr lang="en-US"/>
           </a:p>
@@ -414,7 +414,7 @@
           <a:p>
             <a:fld id="{2651AF3B-1BD3-174A-9630-BFBC83A3749E}" type="datetimeFigureOut">
               <a:rPr lang="en-US" smtClean="0"/>
-              <a:t>6/5/20</a:t>
+              <a:t>6/11/20</a:t>
             </a:fld>
             <a:endParaRPr lang="en-US"/>
           </a:p>
@@ -594,7 +594,7 @@
           <a:p>
             <a:fld id="{2651AF3B-1BD3-174A-9630-BFBC83A3749E}" type="datetimeFigureOut">
               <a:rPr lang="en-US" smtClean="0"/>
-              <a:t>6/5/20</a:t>
+              <a:t>6/11/20</a:t>
             </a:fld>
             <a:endParaRPr lang="en-US"/>
           </a:p>
@@ -764,7 +764,7 @@
           <a:p>
             <a:fld id="{2651AF3B-1BD3-174A-9630-BFBC83A3749E}" type="datetimeFigureOut">
               <a:rPr lang="en-US" smtClean="0"/>
-              <a:t>6/5/20</a:t>
+              <a:t>6/11/20</a:t>
             </a:fld>
             <a:endParaRPr lang="en-US"/>
           </a:p>
@@ -1008,7 +1008,7 @@
           <a:p>
             <a:fld id="{2651AF3B-1BD3-174A-9630-BFBC83A3749E}" type="datetimeFigureOut">
               <a:rPr lang="en-US" smtClean="0"/>
-              <a:t>6/5/20</a:t>
+              <a:t>6/11/20</a:t>
             </a:fld>
             <a:endParaRPr lang="en-US"/>
           </a:p>
@@ -1240,7 +1240,7 @@
           <a:p>
             <a:fld id="{2651AF3B-1BD3-174A-9630-BFBC83A3749E}" type="datetimeFigureOut">
               <a:rPr lang="en-US" smtClean="0"/>
-              <a:t>6/5/20</a:t>
+              <a:t>6/11/20</a:t>
             </a:fld>
             <a:endParaRPr lang="en-US"/>
           </a:p>
@@ -1607,7 +1607,7 @@
           <a:p>
             <a:fld id="{2651AF3B-1BD3-174A-9630-BFBC83A3749E}" type="datetimeFigureOut">
               <a:rPr lang="en-US" smtClean="0"/>
-              <a:t>6/5/20</a:t>
+              <a:t>6/11/20</a:t>
             </a:fld>
             <a:endParaRPr lang="en-US"/>
           </a:p>
@@ -1725,7 +1725,7 @@
           <a:p>
             <a:fld id="{2651AF3B-1BD3-174A-9630-BFBC83A3749E}" type="datetimeFigureOut">
               <a:rPr lang="en-US" smtClean="0"/>
-              <a:t>6/5/20</a:t>
+              <a:t>6/11/20</a:t>
             </a:fld>
             <a:endParaRPr lang="en-US"/>
           </a:p>
@@ -1820,7 +1820,7 @@
           <a:p>
             <a:fld id="{2651AF3B-1BD3-174A-9630-BFBC83A3749E}" type="datetimeFigureOut">
               <a:rPr lang="en-US" smtClean="0"/>
-              <a:t>6/5/20</a:t>
+              <a:t>6/11/20</a:t>
             </a:fld>
             <a:endParaRPr lang="en-US"/>
           </a:p>
@@ -2097,7 +2097,7 @@
           <a:p>
             <a:fld id="{2651AF3B-1BD3-174A-9630-BFBC83A3749E}" type="datetimeFigureOut">
               <a:rPr lang="en-US" smtClean="0"/>
-              <a:t>6/5/20</a:t>
+              <a:t>6/11/20</a:t>
             </a:fld>
             <a:endParaRPr lang="en-US"/>
           </a:p>
@@ -2354,7 +2354,7 @@
           <a:p>
             <a:fld id="{2651AF3B-1BD3-174A-9630-BFBC83A3749E}" type="datetimeFigureOut">
               <a:rPr lang="en-US" smtClean="0"/>
-              <a:t>6/5/20</a:t>
+              <a:t>6/11/20</a:t>
             </a:fld>
             <a:endParaRPr lang="en-US"/>
           </a:p>
@@ -2567,7 +2567,7 @@
           <a:p>
             <a:fld id="{2651AF3B-1BD3-174A-9630-BFBC83A3749E}" type="datetimeFigureOut">
               <a:rPr lang="en-US" smtClean="0"/>
-              <a:t>6/5/20</a:t>
+              <a:t>6/11/20</a:t>
             </a:fld>
             <a:endParaRPr lang="en-US"/>
           </a:p>
@@ -3016,7 +3016,7 @@
         </p:nvGrpSpPr>
         <p:grpSpPr>
           <a:xfrm>
-            <a:off x="1644730" y="7392610"/>
+            <a:off x="1644730" y="7670410"/>
             <a:ext cx="3460384" cy="643259"/>
             <a:chOff x="378896" y="5141388"/>
             <a:chExt cx="5114483" cy="950743"/>
@@ -3127,7 +3127,7 @@
         </p:nvGrpSpPr>
         <p:grpSpPr>
           <a:xfrm>
-            <a:off x="652289" y="8300464"/>
+            <a:off x="652289" y="8439364"/>
             <a:ext cx="5553420" cy="823743"/>
             <a:chOff x="747194" y="7989816"/>
             <a:chExt cx="9632673" cy="1428821"/>
@@ -3800,6 +3800,41 @@
             <a:r>
               <a:rPr lang="en-US" sz="2000" dirty="0"/>
               <a:t> June 2020, Lisbon, Portugal</a:t>
+            </a:r>
+          </a:p>
+        </p:txBody>
+      </p:sp>
+      <p:sp>
+        <p:nvSpPr>
+          <p:cNvPr id="2" name="TextBox 1">
+            <a:extLst>
+              <a:ext uri="{FF2B5EF4-FFF2-40B4-BE49-F238E27FC236}">
+                <a16:creationId xmlns:a16="http://schemas.microsoft.com/office/drawing/2014/main" id="{37440621-2197-8C4C-887C-81715F81E97E}"/>
+              </a:ext>
+            </a:extLst>
+          </p:cNvPr>
+          <p:cNvSpPr txBox="1"/>
+          <p:nvPr/>
+        </p:nvSpPr>
+        <p:spPr>
+          <a:xfrm>
+            <a:off x="2411036" y="6830296"/>
+            <a:ext cx="1824089" cy="369332"/>
+          </a:xfrm>
+          <a:prstGeom prst="rect">
+            <a:avLst/>
+          </a:prstGeom>
+          <a:noFill/>
+        </p:spPr>
+        <p:txBody>
+          <a:bodyPr wrap="none" rtlCol="0">
+            <a:spAutoFit/>
+          </a:bodyPr>
+          <a:lstStyle/>
+          <a:p>
+            <a:r>
+              <a:rPr lang="en-US" dirty="0"/>
+              <a:t>Book of Abstracts</a:t>
             </a:r>
           </a:p>
         </p:txBody>

</xml_diff>